<commit_message>
Updated Experiments Date to 1 Nov 2021
Former-commit-id: 7f8f7e85d3c7f4c62f77ea9e118d4e341962e2ac
</commit_message>
<xml_diff>
--- a/Data/Examples/ROS-GeoPose/Experiments/ExperimentsInfo.pptx
+++ b/Data/Examples/ROS-GeoPose/Experiments/ExperimentsInfo.pptx
@@ -23,7 +23,7 @@
       <p:boldItalic r:id="rId9"/>
     </p:embeddedFont>
     <p:embeddedFont>
-      <p:font typeface="Lato" panose="020B0604020202020204" charset="0"/>
+      <p:font typeface="Lato" panose="020F0502020204030203" pitchFamily="34" charset="0"/>
       <p:regular r:id="rId10"/>
       <p:bold r:id="rId11"/>
       <p:italic r:id="rId12"/>
@@ -264,7 +264,7 @@
       <p15:sldGuideLst xmlns:p15="http://schemas.microsoft.com/office/powerpoint/2012/main"/>
     </p:ext>
     <p:ext uri="http://customooxmlschemas.google.com/">
-      <go:slidesCustomData xmlns="" xmlns:mc="http://schemas.openxmlformats.org/markup-compatibility/2006" xmlns:mv="urn:schemas-microsoft-com:mac:vml" xmlns:c="http://schemas.openxmlformats.org/drawingml/2006/chart" xmlns:dgm="http://schemas.openxmlformats.org/drawingml/2006/diagram" xmlns:o="urn:schemas-microsoft-com:office:office" xmlns:v="urn:schemas-microsoft-com:vml" xmlns:pvml="urn:schemas-microsoft-com:office:powerpoint" xmlns:com="http://schemas.openxmlformats.org/drawingml/2006/compatibility" xmlns:p14="http://schemas.microsoft.com/office/powerpoint/2010/main" xmlns:p15="http://schemas.microsoft.com/office/powerpoint/2012/main" xmlns:ahyp="http://schemas.microsoft.com/office/drawing/2018/hyperlinkcolor" xmlns:go="http://customooxmlschemas.google.com/" r:id="rId22" roundtripDataSignature="AMtx7mjJqoClH8vldesXdiRpI53dfbUErw=="/>
+      <go:slidesCustomData xmlns:go="http://customooxmlschemas.google.com/" xmlns:ahyp="http://schemas.microsoft.com/office/drawing/2018/hyperlinkcolor" xmlns:p15="http://schemas.microsoft.com/office/powerpoint/2012/main" xmlns:p14="http://schemas.microsoft.com/office/powerpoint/2010/main" xmlns:com="http://schemas.openxmlformats.org/drawingml/2006/compatibility" xmlns:pvml="urn:schemas-microsoft-com:office:powerpoint" xmlns:v="urn:schemas-microsoft-com:vml" xmlns:o="urn:schemas-microsoft-com:office:office" xmlns:dgm="http://schemas.openxmlformats.org/drawingml/2006/diagram" xmlns:c="http://schemas.openxmlformats.org/drawingml/2006/chart" xmlns:mv="urn:schemas-microsoft-com:mac:vml" xmlns:mc="http://schemas.openxmlformats.org/markup-compatibility/2006" xmlns="" r:id="rId22" roundtripDataSignature="AMtx7mjJqoClH8vldesXdiRpI53dfbUErw=="/>
     </p:ext>
   </p:extLst>
 </p:presentation>
@@ -7150,7 +7150,23 @@
             </a:pPr>
             <a:r>
               <a:rPr lang="en-US" sz="2400" dirty="0"/>
-              <a:t>We expect to be finished 1</a:t>
+              <a:t>We expect to be finished </a:t>
+            </a:r>
+            <a:r>
+              <a:rPr lang="en-US" sz="2400" strike="sngStrike" dirty="0"/>
+              <a:t>1</a:t>
+            </a:r>
+            <a:r>
+              <a:rPr lang="en-US" sz="2400" strike="sngStrike" baseline="30000" dirty="0"/>
+              <a:t>st</a:t>
+            </a:r>
+            <a:r>
+              <a:rPr lang="en-US" sz="2400" strike="sngStrike" dirty="0"/>
+              <a:t> October 2021 </a:t>
+            </a:r>
+            <a:r>
+              <a:rPr lang="en-US" sz="2400" dirty="0"/>
+              <a:t>1</a:t>
             </a:r>
             <a:r>
               <a:rPr lang="en-US" sz="2400" baseline="30000" dirty="0"/>
@@ -7158,7 +7174,11 @@
             </a:r>
             <a:r>
               <a:rPr lang="en-US" sz="2400" dirty="0"/>
-              <a:t> October 2021</a:t>
+              <a:t> November 2021</a:t>
+            </a:r>
+            <a:r>
+              <a:rPr lang="en-US" sz="2400" strike="sngStrike" dirty="0"/>
+              <a:t>.</a:t>
             </a:r>
           </a:p>
           <a:p>

</xml_diff>